<commit_message>
*Minor revisions and finishing touches to Milestone 1
</commit_message>
<xml_diff>
--- a/Milestone 1/Milestone 1/ENSE 470 Milestone 1.pptx
+++ b/Milestone 1/Milestone 1/ENSE 470 Milestone 1.pptx
@@ -109,7 +109,7 @@
   </p:defaultTextStyle>
   <p:extLst>
     <p:ext uri="{EFAFB233-063F-42B5-8137-9DF3F51BA10A}">
-      <p15:sldGuideLst xmlns:p15="http://schemas.microsoft.com/office/powerpoint/2012/main"/>
+      <p15:sldGuideLst xmlns:p15="http://schemas.microsoft.com/office/powerpoint/2012/main" xmlns=""/>
     </p:ext>
   </p:extLst>
 </p:presentation>
@@ -6231,7 +6231,7 @@
           <p:cNvPr id="2" name="Title 1">
             <a:extLst>
               <a:ext uri="{FF2B5EF4-FFF2-40B4-BE49-F238E27FC236}">
-                <a16:creationId xmlns:a16="http://schemas.microsoft.com/office/drawing/2014/main" id="{ED90C933-1DEC-4FE2-870E-CDD2DF937983}"/>
+                <a16:creationId xmlns:a16="http://schemas.microsoft.com/office/drawing/2014/main" xmlns="" id="{ED90C933-1DEC-4FE2-870E-CDD2DF937983}"/>
               </a:ext>
             </a:extLst>
           </p:cNvPr>
@@ -6259,7 +6259,7 @@
           <p:cNvPr id="3" name="Content Placeholder 2">
             <a:extLst>
               <a:ext uri="{FF2B5EF4-FFF2-40B4-BE49-F238E27FC236}">
-                <a16:creationId xmlns:a16="http://schemas.microsoft.com/office/drawing/2014/main" id="{66A6B280-B7A3-4264-B1B7-02CC4A531183}"/>
+                <a16:creationId xmlns:a16="http://schemas.microsoft.com/office/drawing/2014/main" xmlns="" id="{66A6B280-B7A3-4264-B1B7-02CC4A531183}"/>
               </a:ext>
             </a:extLst>
           </p:cNvPr>
@@ -6340,7 +6340,7 @@
           <p:cNvPr id="2" name="TextBox 1">
             <a:extLst>
               <a:ext uri="{FF2B5EF4-FFF2-40B4-BE49-F238E27FC236}">
-                <a16:creationId xmlns:a16="http://schemas.microsoft.com/office/drawing/2014/main" id="{87358371-9CB6-4908-921E-87A6E1D86558}"/>
+                <a16:creationId xmlns:a16="http://schemas.microsoft.com/office/drawing/2014/main" xmlns="" id="{87358371-9CB6-4908-921E-87A6E1D86558}"/>
               </a:ext>
             </a:extLst>
           </p:cNvPr>
@@ -6373,69 +6373,47 @@
           </a:p>
         </p:txBody>
       </p:sp>
-      <p:graphicFrame>
-        <p:nvGraphicFramePr>
-          <p:cNvPr id="3" name="Object 2">
+      <p:pic>
+        <p:nvPicPr>
+          <p:cNvPr id="1028" name="Picture 4" descr="C:\Users\Quinn\Dropbox\College\Semester 11 2018 Winter\ENSE 470\ENSE-470-Project\Milestone 1\Milestone 1\Current State VSM.png"/>
+          <p:cNvPicPr>
+            <a:picLocks noChangeAspect="1" noChangeArrowheads="1"/>
+          </p:cNvPicPr>
+          <p:nvPr/>
+        </p:nvPicPr>
+        <p:blipFill>
+          <a:blip r:embed="rId2">
             <a:extLst>
-              <a:ext uri="{FF2B5EF4-FFF2-40B4-BE49-F238E27FC236}">
-                <a16:creationId xmlns:a16="http://schemas.microsoft.com/office/drawing/2014/main" id="{33FA5FFB-8534-4EF2-BDC9-7A1FCC8D58D4}"/>
+              <a:ext uri="{28A0092B-C50C-407E-A947-70E740481C1C}">
+                <a14:useLocalDpi xmlns:a14="http://schemas.microsoft.com/office/drawing/2010/main" val="0"/>
               </a:ext>
             </a:extLst>
-          </p:cNvPr>
-          <p:cNvGraphicFramePr>
-            <a:graphicFrameLocks noChangeAspect="1"/>
-          </p:cNvGraphicFramePr>
-          <p:nvPr>
-            <p:extLst>
-              <p:ext uri="{D42A27DB-BD31-4B8C-83A1-F6EECF244321}">
-                <p14:modId xmlns:p14="http://schemas.microsoft.com/office/powerpoint/2010/main" val="1398715809"/>
-              </p:ext>
-            </p:extLst>
-          </p:nvPr>
-        </p:nvGraphicFramePr>
-        <p:xfrm>
-          <a:off x="3205334" y="1137660"/>
-          <a:ext cx="7638996" cy="5147423"/>
-        </p:xfrm>
-        <a:graphic>
-          <a:graphicData uri="http://schemas.openxmlformats.org/presentationml/2006/ole">
-            <mc:AlternateContent xmlns:mc="http://schemas.openxmlformats.org/markup-compatibility/2006">
-              <mc:Choice xmlns:v="urn:schemas-microsoft-com:vml" Requires="v">
-                <p:oleObj spid="_x0000_s1027" name="Acrobat Document" r:id="rId3" imgW="4960301" imgH="4282377" progId="AcroExch.Document.DC">
-                  <p:embed/>
-                </p:oleObj>
-              </mc:Choice>
-              <mc:Fallback>
-                <p:oleObj name="Acrobat Document" r:id="rId3" imgW="4960301" imgH="4282377" progId="AcroExch.Document.DC">
-                  <p:embed/>
-                  <p:pic>
-                    <p:nvPicPr>
-                      <p:cNvPr id="0" name=""/>
-                      <p:cNvPicPr/>
-                      <p:nvPr/>
-                    </p:nvPicPr>
-                    <p:blipFill>
-                      <a:blip r:embed="rId4"/>
-                      <a:stretch>
-                        <a:fillRect/>
-                      </a:stretch>
-                    </p:blipFill>
-                    <p:spPr>
-                      <a:xfrm>
-                        <a:off x="3205334" y="1137660"/>
-                        <a:ext cx="7638996" cy="5147423"/>
-                      </a:xfrm>
-                      <a:prstGeom prst="rect">
-                        <a:avLst/>
-                      </a:prstGeom>
-                    </p:spPr>
-                  </p:pic>
-                </p:oleObj>
-              </mc:Fallback>
-            </mc:AlternateContent>
-          </a:graphicData>
-        </a:graphic>
-      </p:graphicFrame>
+          </a:blip>
+          <a:srcRect/>
+          <a:stretch>
+            <a:fillRect/>
+          </a:stretch>
+        </p:blipFill>
+        <p:spPr bwMode="auto">
+          <a:xfrm>
+            <a:off x="2166031" y="808970"/>
+            <a:ext cx="8080148" cy="5915894"/>
+          </a:xfrm>
+          <a:prstGeom prst="rect">
+            <a:avLst/>
+          </a:prstGeom>
+          <a:noFill/>
+          <a:extLst>
+            <a:ext uri="{909E8E84-426E-40DD-AFC4-6F175D3DCCD1}">
+              <a14:hiddenFill xmlns:a14="http://schemas.microsoft.com/office/drawing/2010/main">
+                <a:solidFill>
+                  <a:srgbClr val="FFFFFF"/>
+                </a:solidFill>
+              </a14:hiddenFill>
+            </a:ext>
+          </a:extLst>
+        </p:spPr>
+      </p:pic>
     </p:spTree>
     <p:extLst>
       <p:ext uri="{BB962C8B-B14F-4D97-AF65-F5344CB8AC3E}">
@@ -6471,7 +6449,7 @@
           <p:cNvPr id="2" name="Title 1">
             <a:extLst>
               <a:ext uri="{FF2B5EF4-FFF2-40B4-BE49-F238E27FC236}">
-                <a16:creationId xmlns:a16="http://schemas.microsoft.com/office/drawing/2014/main" id="{E72D8A36-D704-4EA1-B09E-9B42AF720A08}"/>
+                <a16:creationId xmlns:a16="http://schemas.microsoft.com/office/drawing/2014/main" xmlns="" id="{E72D8A36-D704-4EA1-B09E-9B42AF720A08}"/>
               </a:ext>
             </a:extLst>
           </p:cNvPr>
@@ -6506,7 +6484,7 @@
           <p:cNvPr id="3" name="Content Placeholder 2">
             <a:extLst>
               <a:ext uri="{FF2B5EF4-FFF2-40B4-BE49-F238E27FC236}">
-                <a16:creationId xmlns:a16="http://schemas.microsoft.com/office/drawing/2014/main" id="{3F05A25F-6FB3-41EF-908D-8EB4A4EF4877}"/>
+                <a16:creationId xmlns:a16="http://schemas.microsoft.com/office/drawing/2014/main" xmlns="" id="{3F05A25F-6FB3-41EF-908D-8EB4A4EF4877}"/>
               </a:ext>
             </a:extLst>
           </p:cNvPr>
@@ -6519,7 +6497,7 @@
         </p:nvSpPr>
         <p:spPr>
           <a:xfrm>
-            <a:off x="1942651" y="1295400"/>
+            <a:off x="1551953" y="1245523"/>
             <a:ext cx="10018713" cy="5393194"/>
           </a:xfrm>
         </p:spPr>
@@ -6546,8 +6524,45 @@
                   <a:srgbClr val="30ACEC"/>
                 </a:solidFill>
               </a:rPr>
-              <a:t>It was simple and a helped us meet our team members and work together to accomplish a task</a:t>
-            </a:r>
+              <a:t>It was </a:t>
+            </a:r>
+            <a:r>
+              <a:rPr lang="en-US" dirty="0" smtClean="0">
+                <a:solidFill>
+                  <a:srgbClr val="30ACEC"/>
+                </a:solidFill>
+              </a:rPr>
+              <a:t>a nice introductory task that helped </a:t>
+            </a:r>
+            <a:r>
+              <a:rPr lang="en-US" dirty="0">
+                <a:solidFill>
+                  <a:srgbClr val="30ACEC"/>
+                </a:solidFill>
+              </a:rPr>
+              <a:t>us meet our team members and work together to accomplish a </a:t>
+            </a:r>
+            <a:r>
+              <a:rPr lang="en-US" dirty="0" smtClean="0">
+                <a:solidFill>
+                  <a:srgbClr val="30ACEC"/>
+                </a:solidFill>
+              </a:rPr>
+              <a:t>task. </a:t>
+            </a:r>
+            <a:r>
+              <a:rPr lang="en-US" dirty="0" smtClean="0">
+                <a:solidFill>
+                  <a:srgbClr val="30ACEC"/>
+                </a:solidFill>
+              </a:rPr>
+              <a:t>It is a good first task and very good time-wise.</a:t>
+            </a:r>
+            <a:endParaRPr lang="en-US" dirty="0">
+              <a:solidFill>
+                <a:srgbClr val="30ACEC"/>
+              </a:solidFill>
+            </a:endParaRPr>
           </a:p>
           <a:p>
             <a:pPr>
@@ -6572,8 +6587,53 @@
                   <a:srgbClr val="30ACEC"/>
                 </a:solidFill>
               </a:rPr>
-              <a:t>We learned about our team members different strengths and how to divide up the work equally amongst one another</a:t>
-            </a:r>
+              <a:t>We learned </a:t>
+            </a:r>
+            <a:r>
+              <a:rPr lang="en-US" dirty="0" smtClean="0">
+                <a:solidFill>
+                  <a:srgbClr val="30ACEC"/>
+                </a:solidFill>
+              </a:rPr>
+              <a:t>some of our </a:t>
+            </a:r>
+            <a:r>
+              <a:rPr lang="en-US" dirty="0">
+                <a:solidFill>
+                  <a:srgbClr val="30ACEC"/>
+                </a:solidFill>
+              </a:rPr>
+              <a:t>team </a:t>
+            </a:r>
+            <a:r>
+              <a:rPr lang="en-US" dirty="0" smtClean="0">
+                <a:solidFill>
+                  <a:srgbClr val="30ACEC"/>
+                </a:solidFill>
+              </a:rPr>
+              <a:t>member’s </a:t>
+            </a:r>
+            <a:r>
+              <a:rPr lang="en-US" dirty="0">
+                <a:solidFill>
+                  <a:srgbClr val="30ACEC"/>
+                </a:solidFill>
+              </a:rPr>
+              <a:t>different strengths and how to divide up the work equally amongst one </a:t>
+            </a:r>
+            <a:r>
+              <a:rPr lang="en-US" dirty="0" smtClean="0">
+                <a:solidFill>
+                  <a:srgbClr val="30ACEC"/>
+                </a:solidFill>
+              </a:rPr>
+              <a:t>another.</a:t>
+            </a:r>
+            <a:endParaRPr lang="en-US" dirty="0">
+              <a:solidFill>
+                <a:srgbClr val="30ACEC"/>
+              </a:solidFill>
+            </a:endParaRPr>
           </a:p>
           <a:p>
             <a:pPr>
@@ -6598,8 +6658,37 @@
                   <a:srgbClr val="30ACEC"/>
                 </a:solidFill>
               </a:rPr>
-              <a:t>Our understanding of VSM diagrams will further our design knowledge in later milestones</a:t>
-            </a:r>
+              <a:t>Our understanding of VSM diagrams will further our design knowledge in later </a:t>
+            </a:r>
+            <a:r>
+              <a:rPr lang="en-US" dirty="0" smtClean="0">
+                <a:solidFill>
+                  <a:srgbClr val="30ACEC"/>
+                </a:solidFill>
+              </a:rPr>
+              <a:t>milestones and the use of </a:t>
+            </a:r>
+            <a:r>
+              <a:rPr lang="en-US" dirty="0" err="1" smtClean="0">
+                <a:solidFill>
+                  <a:srgbClr val="30ACEC"/>
+                </a:solidFill>
+              </a:rPr>
+              <a:t>git</a:t>
+            </a:r>
+            <a:r>
+              <a:rPr lang="en-US" dirty="0" smtClean="0">
+                <a:solidFill>
+                  <a:srgbClr val="30ACEC"/>
+                </a:solidFill>
+              </a:rPr>
+              <a:t> will become extremely valuable when collaborating.</a:t>
+            </a:r>
+            <a:endParaRPr lang="en-US" dirty="0">
+              <a:solidFill>
+                <a:srgbClr val="30ACEC"/>
+              </a:solidFill>
+            </a:endParaRPr>
           </a:p>
           <a:p>
             <a:pPr>
@@ -6685,7 +6774,7 @@
     </a:clrScheme>
     <a:fontScheme name="Parallax">
       <a:majorFont>
-        <a:latin typeface="Corbel" panose="020B0503020204020204"/>
+        <a:latin typeface="Corbel"/>
         <a:ea typeface=""/>
         <a:cs typeface=""/>
         <a:font script="Jpan" typeface="HGｺﾞｼｯｸM"/>
@@ -6720,7 +6809,7 @@
         <a:font script="Geor" typeface="Sylfaen"/>
       </a:majorFont>
       <a:minorFont>
-        <a:latin typeface="Corbel" panose="020B0503020204020204"/>
+        <a:latin typeface="Corbel"/>
         <a:ea typeface=""/>
         <a:cs typeface=""/>
         <a:font script="Jpan" typeface="HGｺﾞｼｯｸM"/>
@@ -6892,7 +6981,7 @@
   <a:extraClrSchemeLst/>
   <a:extLst>
     <a:ext uri="{05A4C25C-085E-4340-85A3-A5531E510DB2}">
-      <thm15:themeFamily xmlns:thm15="http://schemas.microsoft.com/office/thememl/2012/main" name="Parallax" id="{3388167B-A2EB-4685-9635-1831D9AEF8C4}" vid="{4F7A876A-7598-49CA-AFC8-8EDA2551E4A7}"/>
+      <thm15:themeFamily xmlns:thm15="http://schemas.microsoft.com/office/thememl/2012/main" xmlns="" name="Parallax" id="{3388167B-A2EB-4685-9635-1831D9AEF8C4}" vid="{4F7A876A-7598-49CA-AFC8-8EDA2551E4A7}"/>
     </a:ext>
   </a:extLst>
 </a:theme>

</xml_diff>